<commit_message>
add powerpoint and example powerpoint
</commit_message>
<xml_diff>
--- a/proposal/Proposal.pptx
+++ b/proposal/Proposal.pptx
@@ -8,13 +8,15 @@
     <p:sldId id="256" r:id="rId2"/>
     <p:sldId id="257" r:id="rId3"/>
     <p:sldId id="258" r:id="rId4"/>
-    <p:sldId id="259" r:id="rId5"/>
-    <p:sldId id="260" r:id="rId6"/>
-    <p:sldId id="261" r:id="rId7"/>
-    <p:sldId id="262" r:id="rId8"/>
-    <p:sldId id="263" r:id="rId9"/>
-    <p:sldId id="264" r:id="rId10"/>
-    <p:sldId id="265" r:id="rId11"/>
+    <p:sldId id="266" r:id="rId5"/>
+    <p:sldId id="259" r:id="rId6"/>
+    <p:sldId id="260" r:id="rId7"/>
+    <p:sldId id="261" r:id="rId8"/>
+    <p:sldId id="267" r:id="rId9"/>
+    <p:sldId id="262" r:id="rId10"/>
+    <p:sldId id="263" r:id="rId11"/>
+    <p:sldId id="264" r:id="rId12"/>
+    <p:sldId id="265" r:id="rId13"/>
   </p:sldIdLst>
   <p:sldSz cx="12192000" cy="6858000"/>
   <p:notesSz cx="6858000" cy="9144000"/>
@@ -113,6 +115,11 @@
       </a:defRPr>
     </a:lvl9pPr>
   </p:defaultTextStyle>
+  <p:extLst>
+    <p:ext uri="{EFAFB233-063F-42B5-8137-9DF3F51BA10A}">
+      <p15:sldGuideLst xmlns:p15="http://schemas.microsoft.com/office/powerpoint/2012/main"/>
+    </p:ext>
+  </p:extLst>
 </p:presentation>
 </file>
 
@@ -263,7 +270,7 @@
           <a:p>
             <a:fld id="{FDEE6F2B-8AF1-43EC-B370-FCA2CA48B921}" type="datetimeFigureOut">
               <a:rPr lang="en-US" smtClean="0"/>
-              <a:t>1/28/2025</a:t>
+              <a:t>1/29/2025</a:t>
             </a:fld>
             <a:endParaRPr lang="en-US"/>
           </a:p>
@@ -461,7 +468,7 @@
           <a:p>
             <a:fld id="{FDEE6F2B-8AF1-43EC-B370-FCA2CA48B921}" type="datetimeFigureOut">
               <a:rPr lang="en-US" smtClean="0"/>
-              <a:t>1/28/2025</a:t>
+              <a:t>1/29/2025</a:t>
             </a:fld>
             <a:endParaRPr lang="en-US"/>
           </a:p>
@@ -669,7 +676,7 @@
           <a:p>
             <a:fld id="{FDEE6F2B-8AF1-43EC-B370-FCA2CA48B921}" type="datetimeFigureOut">
               <a:rPr lang="en-US" smtClean="0"/>
-              <a:t>1/28/2025</a:t>
+              <a:t>1/29/2025</a:t>
             </a:fld>
             <a:endParaRPr lang="en-US"/>
           </a:p>
@@ -867,7 +874,7 @@
           <a:p>
             <a:fld id="{FDEE6F2B-8AF1-43EC-B370-FCA2CA48B921}" type="datetimeFigureOut">
               <a:rPr lang="en-US" smtClean="0"/>
-              <a:t>1/28/2025</a:t>
+              <a:t>1/29/2025</a:t>
             </a:fld>
             <a:endParaRPr lang="en-US"/>
           </a:p>
@@ -1142,7 +1149,7 @@
           <a:p>
             <a:fld id="{FDEE6F2B-8AF1-43EC-B370-FCA2CA48B921}" type="datetimeFigureOut">
               <a:rPr lang="en-US" smtClean="0"/>
-              <a:t>1/28/2025</a:t>
+              <a:t>1/29/2025</a:t>
             </a:fld>
             <a:endParaRPr lang="en-US"/>
           </a:p>
@@ -1407,7 +1414,7 @@
           <a:p>
             <a:fld id="{FDEE6F2B-8AF1-43EC-B370-FCA2CA48B921}" type="datetimeFigureOut">
               <a:rPr lang="en-US" smtClean="0"/>
-              <a:t>1/28/2025</a:t>
+              <a:t>1/29/2025</a:t>
             </a:fld>
             <a:endParaRPr lang="en-US"/>
           </a:p>
@@ -1819,7 +1826,7 @@
           <a:p>
             <a:fld id="{FDEE6F2B-8AF1-43EC-B370-FCA2CA48B921}" type="datetimeFigureOut">
               <a:rPr lang="en-US" smtClean="0"/>
-              <a:t>1/28/2025</a:t>
+              <a:t>1/29/2025</a:t>
             </a:fld>
             <a:endParaRPr lang="en-US"/>
           </a:p>
@@ -1960,7 +1967,7 @@
           <a:p>
             <a:fld id="{FDEE6F2B-8AF1-43EC-B370-FCA2CA48B921}" type="datetimeFigureOut">
               <a:rPr lang="en-US" smtClean="0"/>
-              <a:t>1/28/2025</a:t>
+              <a:t>1/29/2025</a:t>
             </a:fld>
             <a:endParaRPr lang="en-US"/>
           </a:p>
@@ -2073,7 +2080,7 @@
           <a:p>
             <a:fld id="{FDEE6F2B-8AF1-43EC-B370-FCA2CA48B921}" type="datetimeFigureOut">
               <a:rPr lang="en-US" smtClean="0"/>
-              <a:t>1/28/2025</a:t>
+              <a:t>1/29/2025</a:t>
             </a:fld>
             <a:endParaRPr lang="en-US"/>
           </a:p>
@@ -2384,7 +2391,7 @@
           <a:p>
             <a:fld id="{FDEE6F2B-8AF1-43EC-B370-FCA2CA48B921}" type="datetimeFigureOut">
               <a:rPr lang="en-US" smtClean="0"/>
-              <a:t>1/28/2025</a:t>
+              <a:t>1/29/2025</a:t>
             </a:fld>
             <a:endParaRPr lang="en-US"/>
           </a:p>
@@ -2672,7 +2679,7 @@
           <a:p>
             <a:fld id="{FDEE6F2B-8AF1-43EC-B370-FCA2CA48B921}" type="datetimeFigureOut">
               <a:rPr lang="en-US" smtClean="0"/>
-              <a:t>1/28/2025</a:t>
+              <a:t>1/29/2025</a:t>
             </a:fld>
             <a:endParaRPr lang="en-US"/>
           </a:p>
@@ -2913,7 +2920,7 @@
           <a:p>
             <a:fld id="{FDEE6F2B-8AF1-43EC-B370-FCA2CA48B921}" type="datetimeFigureOut">
               <a:rPr lang="en-US" smtClean="0"/>
-              <a:t>1/28/2025</a:t>
+              <a:t>1/29/2025</a:t>
             </a:fld>
             <a:endParaRPr lang="en-US"/>
           </a:p>
@@ -3348,18 +3355,18 @@
         </p:nvSpPr>
         <p:spPr>
           <a:xfrm>
-            <a:off x="1524000" y="1122363"/>
-            <a:ext cx="9144000" cy="1855299"/>
+            <a:off x="1523999" y="1122364"/>
+            <a:ext cx="9660835" cy="1554576"/>
           </a:xfrm>
         </p:spPr>
         <p:txBody>
           <a:bodyPr>
-            <a:normAutofit/>
+            <a:noAutofit/>
           </a:bodyPr>
           <a:lstStyle/>
           <a:p>
             <a:r>
-              <a:rPr lang="th-TH" sz="2800" b="0" dirty="0">
+              <a:rPr lang="th-TH" sz="2600" b="0" dirty="0">
                 <a:solidFill>
                   <a:srgbClr val="000000"/>
                 </a:solidFill>
@@ -3369,14 +3376,14 @@
                     <a:srgbClr val="000000"/>
                   </a:solidFill>
                 </a:uFill>
-                <a:latin typeface="Angsana New" panose="02020603050405020304" pitchFamily="18" charset="-34"/>
+                <a:latin typeface="TH Sarabun New" panose="020B0500040200020003" pitchFamily="34" charset="-34"/>
                 <a:ea typeface="Angsana New" panose="02020603050405020304" pitchFamily="18" charset="-34"/>
                 <a:cs typeface="TH Sarabun New" panose="020B0500040200020003" pitchFamily="34" charset="-34"/>
               </a:rPr>
               <a:t>โปรแกรมค้นหาข้ามภาษาสำหรับค้นคืนค่าสัมประสิทธิ์การปล่อยก๊าซเรือนกระจก</a:t>
             </a:r>
             <a:br>
-              <a:rPr lang="en-US" sz="2800" b="0" dirty="0">
+              <a:rPr lang="en-US" sz="2600" b="0" dirty="0">
                 <a:solidFill>
                   <a:srgbClr val="000000"/>
                 </a:solidFill>
@@ -3386,37 +3393,34 @@
                     <a:srgbClr val="000000"/>
                   </a:solidFill>
                 </a:uFill>
-                <a:latin typeface="Angsana New" panose="02020603050405020304" pitchFamily="18" charset="-34"/>
+                <a:latin typeface="TH Sarabun New" panose="020B0500040200020003" pitchFamily="34" charset="-34"/>
                 <a:ea typeface="Angsana New" panose="02020603050405020304" pitchFamily="18" charset="-34"/>
                 <a:cs typeface="TH Sarabun New" panose="020B0500040200020003" pitchFamily="34" charset="-34"/>
               </a:rPr>
             </a:br>
             <a:br>
-              <a:rPr lang="en-US" sz="2800" b="1" dirty="0">
+              <a:rPr lang="en-US" sz="2600" b="0" i="0" u="none" strike="noStrike" baseline="0" dirty="0">
                 <a:solidFill>
                   <a:srgbClr val="000000"/>
                 </a:solidFill>
-                <a:effectLst/>
-                <a:uFill>
-                  <a:solidFill>
-                    <a:srgbClr val="000000"/>
-                  </a:solidFill>
-                </a:uFill>
-                <a:latin typeface="Angsana New" panose="02020603050405020304" pitchFamily="18" charset="-34"/>
-                <a:ea typeface="Angsana New" panose="02020603050405020304" pitchFamily="18" charset="-34"/>
-                <a:cs typeface="Angsana New" panose="02020603050405020304" pitchFamily="18" charset="-34"/>
+                <a:latin typeface="TH Sarabun New" panose="020B0500040200020003" pitchFamily="34" charset="-34"/>
+                <a:cs typeface="TH Sarabun New" panose="020B0500040200020003" pitchFamily="34" charset="-34"/>
               </a:rPr>
             </a:br>
             <a:r>
-              <a:rPr lang="en-US" sz="2800" dirty="0">
-                <a:effectLst/>
-                <a:latin typeface="TH Sarabun New" panose="020B0500040200020003" pitchFamily="34" charset="-34"/>
-                <a:ea typeface="Arial Unicode MS"/>
-                <a:cs typeface="Browallia New" panose="020B0604020202020204" pitchFamily="34" charset="-34"/>
-              </a:rPr>
-              <a:t>A Cross-lingual Search Engine For Retrieval of Green House Gas Emissions Factor</a:t>
-            </a:r>
-            <a:endParaRPr lang="en-US" sz="8000" dirty="0"/>
+              <a:rPr lang="en-US" sz="2600" i="0" u="none" strike="noStrike" baseline="0" dirty="0">
+                <a:solidFill>
+                  <a:srgbClr val="000000"/>
+                </a:solidFill>
+                <a:latin typeface="TH Sarabun New" panose="020B0500040200020003" pitchFamily="34" charset="-34"/>
+                <a:cs typeface="TH Sarabun New" panose="020B0500040200020003" pitchFamily="34" charset="-34"/>
+              </a:rPr>
+              <a:t> A CROSS-LINGUAL SEARCH ENGINE FOR RETRIEVAL OF GREEN HOUSE GAS EMISSION FACTOR </a:t>
+            </a:r>
+            <a:endParaRPr lang="en-US" sz="2600" dirty="0">
+              <a:latin typeface="TH Sarabun New" panose="020B0500040200020003" pitchFamily="34" charset="-34"/>
+              <a:cs typeface="TH Sarabun New" panose="020B0500040200020003" pitchFamily="34" charset="-34"/>
+            </a:endParaRPr>
           </a:p>
         </p:txBody>
       </p:sp>
@@ -3619,7 +3623,7 @@
         <p:cNvPr id="1" name="">
           <a:extLst>
             <a:ext uri="{FF2B5EF4-FFF2-40B4-BE49-F238E27FC236}">
-              <a16:creationId xmlns:a16="http://schemas.microsoft.com/office/drawing/2014/main" id="{6453A446-5010-33B9-7544-65F807AE5A44}"/>
+              <a16:creationId xmlns:a16="http://schemas.microsoft.com/office/drawing/2014/main" id="{BE4D9706-BA24-A2E7-B363-2ACFA8B814AE}"/>
             </a:ext>
           </a:extLst>
         </p:cNvPr>
@@ -3639,7 +3643,7 @@
           <p:cNvPr id="4" name="Title 3">
             <a:extLst>
               <a:ext uri="{FF2B5EF4-FFF2-40B4-BE49-F238E27FC236}">
-                <a16:creationId xmlns:a16="http://schemas.microsoft.com/office/drawing/2014/main" id="{49E7FCD3-B50D-F522-1D95-DBFD234D664B}"/>
+                <a16:creationId xmlns:a16="http://schemas.microsoft.com/office/drawing/2014/main" id="{87EF514D-63E9-302C-EBB3-9CE0A03BD7AD}"/>
               </a:ext>
             </a:extLst>
           </p:cNvPr>
@@ -3650,26 +3654,457 @@
             <p:ph type="ctrTitle"/>
           </p:nvPr>
         </p:nvSpPr>
-        <p:spPr/>
-        <p:txBody>
-          <a:bodyPr/>
-          <a:lstStyle/>
-          <a:p>
-            <a:r>
-              <a:rPr lang="th-TH" sz="6000" b="0" i="0" u="none" strike="noStrike" baseline="0" dirty="0">
-                <a:latin typeface="TH Sarabun New" panose="020B0500040200020003" pitchFamily="34" charset="-34"/>
-                <a:cs typeface="TH Sarabun New" panose="020B0500040200020003" pitchFamily="34" charset="-34"/>
-              </a:rPr>
-              <a:t>8.ประโยชน์ที่คาดว่าจะได้รับ</a:t>
-            </a:r>
-            <a:endParaRPr lang="en-US" dirty="0"/>
+        <p:spPr>
+          <a:xfrm>
+            <a:off x="0" y="0"/>
+            <a:ext cx="7139354" cy="494402"/>
+          </a:xfrm>
+        </p:spPr>
+        <p:txBody>
+          <a:bodyPr>
+            <a:normAutofit/>
+          </a:bodyPr>
+          <a:lstStyle/>
+          <a:p>
+            <a:pPr algn="l"/>
+            <a:r>
+              <a:rPr lang="th-TH" sz="2600" b="0" i="0" u="none" strike="noStrike" baseline="0" dirty="0">
+                <a:latin typeface="TH Sarabun New" panose="020B0500040200020003" pitchFamily="34" charset="-34"/>
+                <a:cs typeface="TH Sarabun New" panose="020B0500040200020003" pitchFamily="34" charset="-34"/>
+              </a:rPr>
+              <a:t>6.ขอบเขตการวิจัย</a:t>
+            </a:r>
+            <a:endParaRPr lang="en-US" sz="2600" dirty="0"/>
+          </a:p>
+        </p:txBody>
+      </p:sp>
+      <p:sp>
+        <p:nvSpPr>
+          <p:cNvPr id="3" name="TextBox 2">
+            <a:extLst>
+              <a:ext uri="{FF2B5EF4-FFF2-40B4-BE49-F238E27FC236}">
+                <a16:creationId xmlns:a16="http://schemas.microsoft.com/office/drawing/2014/main" id="{86C6FBAA-409E-D7F4-09E1-D435566FBD67}"/>
+              </a:ext>
+            </a:extLst>
+          </p:cNvPr>
+          <p:cNvSpPr txBox="1"/>
+          <p:nvPr/>
+        </p:nvSpPr>
+        <p:spPr>
+          <a:xfrm>
+            <a:off x="1032933" y="1397337"/>
+            <a:ext cx="10625667" cy="2492990"/>
+          </a:xfrm>
+          <a:prstGeom prst="rect">
+            <a:avLst/>
+          </a:prstGeom>
+          <a:noFill/>
+        </p:spPr>
+        <p:txBody>
+          <a:bodyPr wrap="square">
+            <a:spAutoFit/>
+          </a:bodyPr>
+          <a:lstStyle/>
+          <a:p>
+            <a:r>
+              <a:rPr lang="en-US" sz="2600" dirty="0">
+                <a:latin typeface="TH Sarabun New" panose="020B0500040200020003" pitchFamily="34" charset="-34"/>
+                <a:cs typeface="TH Sarabun New" panose="020B0500040200020003" pitchFamily="34" charset="-34"/>
+              </a:rPr>
+              <a:t>1.ใช้ข้อมูล </a:t>
+            </a:r>
+            <a:r>
+              <a:rPr lang="en-US" sz="2600" dirty="0" err="1">
+                <a:latin typeface="TH Sarabun New" panose="020B0500040200020003" pitchFamily="34" charset="-34"/>
+                <a:cs typeface="TH Sarabun New" panose="020B0500040200020003" pitchFamily="34" charset="-34"/>
+              </a:rPr>
+              <a:t>ค่าการปล่อยก๊าซเรือนกระจก</a:t>
+            </a:r>
+            <a:r>
+              <a:rPr lang="en-US" sz="2600" dirty="0">
+                <a:latin typeface="TH Sarabun New" panose="020B0500040200020003" pitchFamily="34" charset="-34"/>
+                <a:cs typeface="TH Sarabun New" panose="020B0500040200020003" pitchFamily="34" charset="-34"/>
+              </a:rPr>
+              <a:t> (Emission Factors) </a:t>
+            </a:r>
+            <a:r>
+              <a:rPr lang="en-US" sz="2600" dirty="0" err="1">
+                <a:latin typeface="TH Sarabun New" panose="020B0500040200020003" pitchFamily="34" charset="-34"/>
+                <a:cs typeface="TH Sarabun New" panose="020B0500040200020003" pitchFamily="34" charset="-34"/>
+              </a:rPr>
+              <a:t>ที่เผยแพร่โดย</a:t>
+            </a:r>
+            <a:r>
+              <a:rPr lang="en-US" sz="2600" dirty="0">
+                <a:latin typeface="TH Sarabun New" panose="020B0500040200020003" pitchFamily="34" charset="-34"/>
+                <a:cs typeface="TH Sarabun New" panose="020B0500040200020003" pitchFamily="34" charset="-34"/>
+              </a:rPr>
+              <a:t> </a:t>
+            </a:r>
+            <a:r>
+              <a:rPr lang="en-US" sz="2600" dirty="0" err="1">
+                <a:latin typeface="TH Sarabun New" panose="020B0500040200020003" pitchFamily="34" charset="-34"/>
+                <a:cs typeface="TH Sarabun New" panose="020B0500040200020003" pitchFamily="34" charset="-34"/>
+              </a:rPr>
+              <a:t>องค์การบริหารจัดการก๊าซเรือนกระจก</a:t>
+            </a:r>
+            <a:r>
+              <a:rPr lang="en-US" sz="2600" dirty="0">
+                <a:latin typeface="TH Sarabun New" panose="020B0500040200020003" pitchFamily="34" charset="-34"/>
+                <a:cs typeface="TH Sarabun New" panose="020B0500040200020003" pitchFamily="34" charset="-34"/>
+              </a:rPr>
+              <a:t> (</a:t>
+            </a:r>
+            <a:r>
+              <a:rPr lang="en-US" sz="2600" dirty="0" err="1">
+                <a:latin typeface="TH Sarabun New" panose="020B0500040200020003" pitchFamily="34" charset="-34"/>
+                <a:cs typeface="TH Sarabun New" panose="020B0500040200020003" pitchFamily="34" charset="-34"/>
+              </a:rPr>
+              <a:t>องค์การมหาชน</a:t>
+            </a:r>
+            <a:r>
+              <a:rPr lang="en-US" sz="2600" dirty="0">
+                <a:latin typeface="TH Sarabun New" panose="020B0500040200020003" pitchFamily="34" charset="-34"/>
+                <a:cs typeface="TH Sarabun New" panose="020B0500040200020003" pitchFamily="34" charset="-34"/>
+              </a:rPr>
+              <a:t>)</a:t>
+            </a:r>
+          </a:p>
+          <a:p>
+            <a:r>
+              <a:rPr lang="en-US" sz="2600" dirty="0">
+                <a:latin typeface="TH Sarabun New" panose="020B0500040200020003" pitchFamily="34" charset="-34"/>
+                <a:cs typeface="TH Sarabun New" panose="020B0500040200020003" pitchFamily="34" charset="-34"/>
+              </a:rPr>
+              <a:t>2.ออกแบบให้สืบค้นได้ทั้งภาษาไทยและอังกฤษด้วย Synonym-based Approach</a:t>
+            </a:r>
+          </a:p>
+          <a:p>
+            <a:r>
+              <a:rPr lang="en-US" sz="2600" dirty="0">
+                <a:latin typeface="TH Sarabun New" panose="020B0500040200020003" pitchFamily="34" charset="-34"/>
+                <a:cs typeface="TH Sarabun New" panose="020B0500040200020003" pitchFamily="34" charset="-34"/>
+              </a:rPr>
+              <a:t>3.ระบบสืบค้นที่ยืดหยุ่นสามารถอัปเดตข้อมูลได้อัตโนอัติเมื่อองค์การบริหารจัดการก๊าซเรือนกระจกมีการเปลี่ยนแปลงข้อมูล</a:t>
+            </a:r>
+          </a:p>
+          <a:p>
+            <a:r>
+              <a:rPr lang="en-US" sz="2600" dirty="0">
+                <a:latin typeface="TH Sarabun New" panose="020B0500040200020003" pitchFamily="34" charset="-34"/>
+                <a:cs typeface="TH Sarabun New" panose="020B0500040200020003" pitchFamily="34" charset="-34"/>
+              </a:rPr>
+              <a:t>4.ประเมินระบบด้วยตัวชี้วัดมาตรฐาน (Precision, Recall) และตรวจสอบความเหมาะสมในการใช้งานจริงสำหรับผู้ใช้ที่มีพื้นฐานต่างกัน</a:t>
+            </a:r>
           </a:p>
         </p:txBody>
       </p:sp>
     </p:spTree>
     <p:extLst>
       <p:ext uri="{BB962C8B-B14F-4D97-AF65-F5344CB8AC3E}">
-        <p14:creationId xmlns:p14="http://schemas.microsoft.com/office/powerpoint/2010/main" val="3428101114"/>
+        <p14:creationId xmlns:p14="http://schemas.microsoft.com/office/powerpoint/2010/main" val="2427576554"/>
+      </p:ext>
+    </p:extLst>
+  </p:cSld>
+  <p:clrMapOvr>
+    <a:masterClrMapping/>
+  </p:clrMapOvr>
+</p:sld>
+</file>
+
+<file path=ppt/slides/slide11.xml><?xml version="1.0" encoding="utf-8"?>
+<p:sld xmlns:a="http://schemas.openxmlformats.org/drawingml/2006/main" xmlns:r="http://schemas.openxmlformats.org/officeDocument/2006/relationships" xmlns:p="http://schemas.openxmlformats.org/presentationml/2006/main">
+  <p:cSld>
+    <p:spTree>
+      <p:nvGrpSpPr>
+        <p:cNvPr id="1" name="">
+          <a:extLst>
+            <a:ext uri="{FF2B5EF4-FFF2-40B4-BE49-F238E27FC236}">
+              <a16:creationId xmlns:a16="http://schemas.microsoft.com/office/drawing/2014/main" id="{10900C5B-5554-33BB-7385-8CCBE66E3979}"/>
+            </a:ext>
+          </a:extLst>
+        </p:cNvPr>
+        <p:cNvGrpSpPr/>
+        <p:nvPr/>
+      </p:nvGrpSpPr>
+      <p:grpSpPr>
+        <a:xfrm>
+          <a:off x="0" y="0"/>
+          <a:ext cx="0" cy="0"/>
+          <a:chOff x="0" y="0"/>
+          <a:chExt cx="0" cy="0"/>
+        </a:xfrm>
+      </p:grpSpPr>
+      <p:sp>
+        <p:nvSpPr>
+          <p:cNvPr id="4" name="Title 3">
+            <a:extLst>
+              <a:ext uri="{FF2B5EF4-FFF2-40B4-BE49-F238E27FC236}">
+                <a16:creationId xmlns:a16="http://schemas.microsoft.com/office/drawing/2014/main" id="{435043D9-AC7C-2AB8-C9AF-E49320A71E69}"/>
+              </a:ext>
+            </a:extLst>
+          </p:cNvPr>
+          <p:cNvSpPr>
+            <a:spLocks noGrp="1"/>
+          </p:cNvSpPr>
+          <p:nvPr>
+            <p:ph type="ctrTitle"/>
+          </p:nvPr>
+        </p:nvSpPr>
+        <p:spPr>
+          <a:xfrm>
+            <a:off x="0" y="0"/>
+            <a:ext cx="7139354" cy="494402"/>
+          </a:xfrm>
+        </p:spPr>
+        <p:txBody>
+          <a:bodyPr>
+            <a:normAutofit/>
+          </a:bodyPr>
+          <a:lstStyle/>
+          <a:p>
+            <a:pPr algn="l"/>
+            <a:r>
+              <a:rPr lang="th-TH" sz="2600" b="0" i="0" u="none" strike="noStrike" baseline="0" dirty="0">
+                <a:latin typeface="TH Sarabun New" panose="020B0500040200020003" pitchFamily="34" charset="-34"/>
+                <a:cs typeface="TH Sarabun New" panose="020B0500040200020003" pitchFamily="34" charset="-34"/>
+              </a:rPr>
+              <a:t>7.ขั้นตอนการดำเนินงาน</a:t>
+            </a:r>
+            <a:endParaRPr lang="en-US" sz="2600" dirty="0"/>
+          </a:p>
+        </p:txBody>
+      </p:sp>
+      <p:sp>
+        <p:nvSpPr>
+          <p:cNvPr id="3" name="TextBox 2">
+            <a:extLst>
+              <a:ext uri="{FF2B5EF4-FFF2-40B4-BE49-F238E27FC236}">
+                <a16:creationId xmlns:a16="http://schemas.microsoft.com/office/drawing/2014/main" id="{497CC8C7-080B-9BCC-0B02-6CC2E1C86B78}"/>
+              </a:ext>
+            </a:extLst>
+          </p:cNvPr>
+          <p:cNvSpPr txBox="1"/>
+          <p:nvPr/>
+        </p:nvSpPr>
+        <p:spPr>
+          <a:xfrm>
+            <a:off x="1077383" y="1185670"/>
+            <a:ext cx="6151032" cy="2893100"/>
+          </a:xfrm>
+          <a:prstGeom prst="rect">
+            <a:avLst/>
+          </a:prstGeom>
+          <a:noFill/>
+        </p:spPr>
+        <p:txBody>
+          <a:bodyPr wrap="square">
+            <a:spAutoFit/>
+          </a:bodyPr>
+          <a:lstStyle/>
+          <a:p>
+            <a:r>
+              <a:rPr lang="en-US" sz="2600" dirty="0">
+                <a:latin typeface="TH Sarabun New" panose="020B0500040200020003" pitchFamily="34" charset="-34"/>
+                <a:cs typeface="TH Sarabun New" panose="020B0500040200020003" pitchFamily="34" charset="-34"/>
+              </a:rPr>
+              <a:t>1.ศึกษาค้นคว้าทฤษฎีและงานวิจัยที่เกี่ยวข้อง</a:t>
+            </a:r>
+          </a:p>
+          <a:p>
+            <a:r>
+              <a:rPr lang="en-US" sz="2600" dirty="0">
+                <a:latin typeface="TH Sarabun New" panose="020B0500040200020003" pitchFamily="34" charset="-34"/>
+                <a:cs typeface="TH Sarabun New" panose="020B0500040200020003" pitchFamily="34" charset="-34"/>
+              </a:rPr>
+              <a:t>2.จัดเตรียมข้อมูล</a:t>
+            </a:r>
+          </a:p>
+          <a:p>
+            <a:r>
+              <a:rPr lang="en-US" sz="2600" dirty="0">
+                <a:latin typeface="TH Sarabun New" panose="020B0500040200020003" pitchFamily="34" charset="-34"/>
+                <a:cs typeface="TH Sarabun New" panose="020B0500040200020003" pitchFamily="34" charset="-34"/>
+              </a:rPr>
+              <a:t>3.สร้างและปรับแต่งประสิทธิภาพโปรแกรม</a:t>
+            </a:r>
+          </a:p>
+          <a:p>
+            <a:r>
+              <a:rPr lang="en-US" sz="2600" dirty="0">
+                <a:latin typeface="TH Sarabun New" panose="020B0500040200020003" pitchFamily="34" charset="-34"/>
+                <a:cs typeface="TH Sarabun New" panose="020B0500040200020003" pitchFamily="34" charset="-34"/>
+              </a:rPr>
+              <a:t>4.ทดสอบและประเมินผล</a:t>
+            </a:r>
+          </a:p>
+          <a:p>
+            <a:r>
+              <a:rPr lang="en-US" sz="2600" dirty="0">
+                <a:latin typeface="TH Sarabun New" panose="020B0500040200020003" pitchFamily="34" charset="-34"/>
+                <a:cs typeface="TH Sarabun New" panose="020B0500040200020003" pitchFamily="34" charset="-34"/>
+              </a:rPr>
+              <a:t>5.วิเคราะห์ </a:t>
+            </a:r>
+            <a:r>
+              <a:rPr lang="en-US" sz="2600" dirty="0" err="1">
+                <a:latin typeface="TH Sarabun New" panose="020B0500040200020003" pitchFamily="34" charset="-34"/>
+                <a:cs typeface="TH Sarabun New" panose="020B0500040200020003" pitchFamily="34" charset="-34"/>
+              </a:rPr>
+              <a:t>สรุปผลการดำเนินงาน</a:t>
+            </a:r>
+            <a:endParaRPr lang="en-US" sz="2600" dirty="0">
+              <a:latin typeface="TH Sarabun New" panose="020B0500040200020003" pitchFamily="34" charset="-34"/>
+              <a:cs typeface="TH Sarabun New" panose="020B0500040200020003" pitchFamily="34" charset="-34"/>
+            </a:endParaRPr>
+          </a:p>
+          <a:p>
+            <a:r>
+              <a:rPr lang="en-US" sz="2600" dirty="0">
+                <a:latin typeface="TH Sarabun New" panose="020B0500040200020003" pitchFamily="34" charset="-34"/>
+                <a:cs typeface="TH Sarabun New" panose="020B0500040200020003" pitchFamily="34" charset="-34"/>
+              </a:rPr>
+              <a:t>6.เรียบเรียงและจัดทำบทความวิจัย</a:t>
+            </a:r>
+          </a:p>
+          <a:p>
+            <a:r>
+              <a:rPr lang="en-US" sz="2600" dirty="0">
+                <a:latin typeface="TH Sarabun New" panose="020B0500040200020003" pitchFamily="34" charset="-34"/>
+                <a:cs typeface="TH Sarabun New" panose="020B0500040200020003" pitchFamily="34" charset="-34"/>
+              </a:rPr>
+              <a:t>7.จัดทำวิทยานิพนธ์</a:t>
+            </a:r>
+          </a:p>
+        </p:txBody>
+      </p:sp>
+    </p:spTree>
+    <p:extLst>
+      <p:ext uri="{BB962C8B-B14F-4D97-AF65-F5344CB8AC3E}">
+        <p14:creationId xmlns:p14="http://schemas.microsoft.com/office/powerpoint/2010/main" val="1198153347"/>
+      </p:ext>
+    </p:extLst>
+  </p:cSld>
+  <p:clrMapOvr>
+    <a:masterClrMapping/>
+  </p:clrMapOvr>
+</p:sld>
+</file>
+
+<file path=ppt/slides/slide12.xml><?xml version="1.0" encoding="utf-8"?>
+<p:sld xmlns:a="http://schemas.openxmlformats.org/drawingml/2006/main" xmlns:r="http://schemas.openxmlformats.org/officeDocument/2006/relationships" xmlns:p="http://schemas.openxmlformats.org/presentationml/2006/main">
+  <p:cSld>
+    <p:spTree>
+      <p:nvGrpSpPr>
+        <p:cNvPr id="1" name="">
+          <a:extLst>
+            <a:ext uri="{FF2B5EF4-FFF2-40B4-BE49-F238E27FC236}">
+              <a16:creationId xmlns:a16="http://schemas.microsoft.com/office/drawing/2014/main" id="{D01D8A5F-FEA3-53F0-BCF1-9547F0D0815F}"/>
+            </a:ext>
+          </a:extLst>
+        </p:cNvPr>
+        <p:cNvGrpSpPr/>
+        <p:nvPr/>
+      </p:nvGrpSpPr>
+      <p:grpSpPr>
+        <a:xfrm>
+          <a:off x="0" y="0"/>
+          <a:ext cx="0" cy="0"/>
+          <a:chOff x="0" y="0"/>
+          <a:chExt cx="0" cy="0"/>
+        </a:xfrm>
+      </p:grpSpPr>
+      <p:sp>
+        <p:nvSpPr>
+          <p:cNvPr id="4" name="Title 3">
+            <a:extLst>
+              <a:ext uri="{FF2B5EF4-FFF2-40B4-BE49-F238E27FC236}">
+                <a16:creationId xmlns:a16="http://schemas.microsoft.com/office/drawing/2014/main" id="{AB67059E-BCFA-3F85-814B-A6192D4EAF2A}"/>
+              </a:ext>
+            </a:extLst>
+          </p:cNvPr>
+          <p:cNvSpPr>
+            <a:spLocks noGrp="1"/>
+          </p:cNvSpPr>
+          <p:nvPr>
+            <p:ph type="ctrTitle"/>
+          </p:nvPr>
+        </p:nvSpPr>
+        <p:spPr>
+          <a:xfrm>
+            <a:off x="0" y="0"/>
+            <a:ext cx="7139354" cy="494402"/>
+          </a:xfrm>
+        </p:spPr>
+        <p:txBody>
+          <a:bodyPr>
+            <a:normAutofit/>
+          </a:bodyPr>
+          <a:lstStyle/>
+          <a:p>
+            <a:pPr algn="l"/>
+            <a:r>
+              <a:rPr lang="th-TH" sz="2600" b="0" i="0" u="none" strike="noStrike" baseline="0" dirty="0">
+                <a:latin typeface="TH Sarabun New" panose="020B0500040200020003" pitchFamily="34" charset="-34"/>
+                <a:cs typeface="TH Sarabun New" panose="020B0500040200020003" pitchFamily="34" charset="-34"/>
+              </a:rPr>
+              <a:t>8.ประโยชน์ที่คาดว่าจะได้รับ</a:t>
+            </a:r>
+            <a:endParaRPr lang="en-US" sz="2600" dirty="0"/>
+          </a:p>
+        </p:txBody>
+      </p:sp>
+      <p:sp>
+        <p:nvSpPr>
+          <p:cNvPr id="6" name="TextBox 5">
+            <a:extLst>
+              <a:ext uri="{FF2B5EF4-FFF2-40B4-BE49-F238E27FC236}">
+                <a16:creationId xmlns:a16="http://schemas.microsoft.com/office/drawing/2014/main" id="{1B570AA0-53F5-1C85-E7E1-FB19975B8AD7}"/>
+              </a:ext>
+            </a:extLst>
+          </p:cNvPr>
+          <p:cNvSpPr txBox="1"/>
+          <p:nvPr/>
+        </p:nvSpPr>
+        <p:spPr>
+          <a:xfrm>
+            <a:off x="662516" y="1319367"/>
+            <a:ext cx="10623551" cy="1692771"/>
+          </a:xfrm>
+          <a:prstGeom prst="rect">
+            <a:avLst/>
+          </a:prstGeom>
+          <a:noFill/>
+        </p:spPr>
+        <p:txBody>
+          <a:bodyPr wrap="square">
+            <a:spAutoFit/>
+          </a:bodyPr>
+          <a:lstStyle/>
+          <a:p>
+            <a:r>
+              <a:rPr lang="th-TH" sz="2600" dirty="0">
+                <a:latin typeface="TH Sarabun New" panose="020B0500040200020003" pitchFamily="34" charset="-34"/>
+                <a:cs typeface="TH Sarabun New" panose="020B0500040200020003" pitchFamily="34" charset="-34"/>
+              </a:rPr>
+              <a:t>ระบบสืบค้นข้ามภาษาที่ใช้งานจริงช่วยให้ผู้ใช้สามารถค้นหาข้อมูลค่าสัมประสิทธิ์การปล่อยก๊าซเรือนกระจกได้อย่างสะดวก โดยไม่ถูกจำกัดด้วยภาษา ซึ่งช่วยให้การเข้าถึงข้อมูลเป็นไปอย่างมีประสิทธิภาพยิ่งขึ้น</a:t>
+            </a:r>
+          </a:p>
+          <a:p>
+            <a:r>
+              <a:rPr lang="th-TH" sz="2600" dirty="0">
+                <a:latin typeface="TH Sarabun New" panose="020B0500040200020003" pitchFamily="34" charset="-34"/>
+                <a:cs typeface="TH Sarabun New" panose="020B0500040200020003" pitchFamily="34" charset="-34"/>
+              </a:rPr>
+              <a:t>นอกจากนี้ ระบบยังช่วยส่งเสริมการวิจัยและการศึกษา โดยเปิดโอกาสให้นักวิจัย นักศึกษา หน่วยงานภาครัฐและเอกชน สามารถสืบค้นข้อมูลทั้งภาษาไทยและภาษาอังกฤษได้ง่ายขึ้น ทำให้การแลกเปลี่ยนและการใช้ข้อมูลมีความราบรื่นมากขึ้น</a:t>
+            </a:r>
+          </a:p>
+        </p:txBody>
+      </p:sp>
+    </p:spTree>
+    <p:extLst>
+      <p:ext uri="{BB962C8B-B14F-4D97-AF65-F5344CB8AC3E}">
+        <p14:creationId xmlns:p14="http://schemas.microsoft.com/office/powerpoint/2010/main" val="3385384950"/>
       </p:ext>
     </p:extLst>
   </p:cSld>
@@ -3732,7 +4167,7 @@
           <a:p>
             <a:pPr algn="l"/>
             <a:r>
-              <a:rPr lang="en-US" sz="2600" dirty="0">
+              <a:rPr lang="en-US" sz="3000" b="1" dirty="0">
                 <a:latin typeface="TH Sarabun New" panose="020B0500040200020003" pitchFamily="34" charset="-34"/>
                 <a:cs typeface="TH Sarabun New" panose="020B0500040200020003" pitchFamily="34" charset="-34"/>
               </a:rPr>
@@ -3749,7 +4184,7 @@
                 <a:latin typeface="TH Sarabun New" panose="020B0500040200020003" pitchFamily="34" charset="-34"/>
                 <a:cs typeface="TH Sarabun New" panose="020B0500040200020003" pitchFamily="34" charset="-34"/>
               </a:rPr>
-              <a:t>1.ที่มาและความสำ คัญของปัญหา</a:t>
+              <a:t>1.ที่มาและความสำคัญของปัญหา</a:t>
             </a:r>
             <a:br>
               <a:rPr lang="th-TH" sz="2600" b="0" i="0" u="none" strike="noStrike" baseline="0" dirty="0">
@@ -3827,7 +4262,7 @@
                 <a:latin typeface="TH Sarabun New" panose="020B0500040200020003" pitchFamily="34" charset="-34"/>
                 <a:cs typeface="TH Sarabun New" panose="020B0500040200020003" pitchFamily="34" charset="-34"/>
               </a:rPr>
-              <a:t>7.ขั้นตอนการดำ เนินงาน</a:t>
+              <a:t>7.ขั้นตอนการดำเนินงาน</a:t>
             </a:r>
             <a:br>
               <a:rPr lang="th-TH" sz="2600" b="0" i="0" u="none" strike="noStrike" baseline="0" dirty="0">
@@ -3903,22 +4338,213 @@
         </p:nvSpPr>
         <p:spPr>
           <a:xfrm>
-            <a:off x="1524000" y="1122363"/>
-            <a:ext cx="7139354" cy="1140191"/>
+            <a:off x="0" y="0"/>
+            <a:ext cx="7139354" cy="494402"/>
           </a:xfrm>
         </p:spPr>
         <p:txBody>
-          <a:bodyPr/>
-          <a:lstStyle/>
-          <a:p>
-            <a:r>
-              <a:rPr lang="th-TH" sz="6000" b="0" i="0" u="none" strike="noStrike" baseline="0" dirty="0">
-                <a:latin typeface="TH Sarabun New" panose="020B0500040200020003" pitchFamily="34" charset="-34"/>
-                <a:cs typeface="TH Sarabun New" panose="020B0500040200020003" pitchFamily="34" charset="-34"/>
-              </a:rPr>
-              <a:t>1.ที่มาและความสำ คัญของปัญหา</a:t>
-            </a:r>
-            <a:endParaRPr lang="en-US" dirty="0"/>
+          <a:bodyPr>
+            <a:normAutofit/>
+          </a:bodyPr>
+          <a:lstStyle/>
+          <a:p>
+            <a:pPr algn="l"/>
+            <a:r>
+              <a:rPr lang="th-TH" sz="2600" b="0" i="0" u="none" strike="noStrike" baseline="0" dirty="0">
+                <a:latin typeface="TH Sarabun New" panose="020B0500040200020003" pitchFamily="34" charset="-34"/>
+                <a:cs typeface="TH Sarabun New" panose="020B0500040200020003" pitchFamily="34" charset="-34"/>
+              </a:rPr>
+              <a:t>1.ที่มาและความสำคัญของปัญหา</a:t>
+            </a:r>
+            <a:endParaRPr lang="en-US" sz="2600" dirty="0"/>
+          </a:p>
+        </p:txBody>
+      </p:sp>
+      <p:sp>
+        <p:nvSpPr>
+          <p:cNvPr id="7" name="TextBox 6">
+            <a:extLst>
+              <a:ext uri="{FF2B5EF4-FFF2-40B4-BE49-F238E27FC236}">
+                <a16:creationId xmlns:a16="http://schemas.microsoft.com/office/drawing/2014/main" id="{150CD080-EEC8-FC17-CAD7-F1A041DBEDE6}"/>
+              </a:ext>
+            </a:extLst>
+          </p:cNvPr>
+          <p:cNvSpPr txBox="1"/>
+          <p:nvPr/>
+        </p:nvSpPr>
+        <p:spPr>
+          <a:xfrm>
+            <a:off x="805066" y="1528140"/>
+            <a:ext cx="11045689" cy="2092881"/>
+          </a:xfrm>
+          <a:prstGeom prst="rect">
+            <a:avLst/>
+          </a:prstGeom>
+          <a:noFill/>
+        </p:spPr>
+        <p:txBody>
+          <a:bodyPr wrap="square">
+            <a:spAutoFit/>
+          </a:bodyPr>
+          <a:lstStyle/>
+          <a:p>
+            <a:r>
+              <a:rPr lang="th-TH" sz="2600" b="0" dirty="0">
+                <a:solidFill>
+                  <a:srgbClr val="000000"/>
+                </a:solidFill>
+                <a:effectLst/>
+                <a:uFill>
+                  <a:solidFill>
+                    <a:srgbClr val="000000"/>
+                  </a:solidFill>
+                </a:uFill>
+                <a:latin typeface="TH Sarabun New" panose="020B0500040200020003" pitchFamily="34" charset="-34"/>
+                <a:ea typeface="Angsana New" panose="02020603050405020304" pitchFamily="18" charset="-34"/>
+                <a:cs typeface="TH Sarabun New" panose="020B0500040200020003" pitchFamily="34" charset="-34"/>
+              </a:rPr>
+              <a:t>ค่าสัมประสิทธิ์การปล่อยก๊าซเรือนกระจก (</a:t>
+            </a:r>
+            <a:r>
+              <a:rPr lang="en-US" sz="2600" b="0" dirty="0">
+                <a:solidFill>
+                  <a:srgbClr val="000000"/>
+                </a:solidFill>
+                <a:effectLst/>
+                <a:uFill>
+                  <a:solidFill>
+                    <a:srgbClr val="000000"/>
+                  </a:solidFill>
+                </a:uFill>
+                <a:latin typeface="TH Sarabun New" panose="020B0500040200020003" pitchFamily="34" charset="-34"/>
+                <a:ea typeface="Angsana New" panose="02020603050405020304" pitchFamily="18" charset="-34"/>
+                <a:cs typeface="TH Sarabun New" panose="020B0500040200020003" pitchFamily="34" charset="-34"/>
+              </a:rPr>
+              <a:t>GHGs Emission Factor: EF) </a:t>
+            </a:r>
+            <a:r>
+              <a:rPr lang="th-TH" sz="2600" b="0" dirty="0">
+                <a:solidFill>
+                  <a:srgbClr val="000000"/>
+                </a:solidFill>
+                <a:effectLst/>
+                <a:uFill>
+                  <a:solidFill>
+                    <a:srgbClr val="000000"/>
+                  </a:solidFill>
+                </a:uFill>
+                <a:latin typeface="TH Sarabun New" panose="020B0500040200020003" pitchFamily="34" charset="-34"/>
+                <a:ea typeface="Angsana New" panose="02020603050405020304" pitchFamily="18" charset="-34"/>
+                <a:cs typeface="TH Sarabun New" panose="020B0500040200020003" pitchFamily="34" charset="-34"/>
+              </a:rPr>
+              <a:t>เป็นค่าการปล่อยก๊าซเรือนกระจกจากการผลิตหรือการบริการ ที่คิดรวมค่าการปล่อยก๊าซเรือนกระจกที่ก่อให้เกิดภาวะโลกร้อน (</a:t>
+            </a:r>
+            <a:r>
+              <a:rPr lang="en-US" sz="2600" b="0" dirty="0">
+                <a:solidFill>
+                  <a:srgbClr val="000000"/>
+                </a:solidFill>
+                <a:effectLst/>
+                <a:uFill>
+                  <a:solidFill>
+                    <a:srgbClr val="000000"/>
+                  </a:solidFill>
+                </a:uFill>
+                <a:latin typeface="TH Sarabun New" panose="020B0500040200020003" pitchFamily="34" charset="-34"/>
+                <a:ea typeface="Angsana New" panose="02020603050405020304" pitchFamily="18" charset="-34"/>
+                <a:cs typeface="TH Sarabun New" panose="020B0500040200020003" pitchFamily="34" charset="-34"/>
+              </a:rPr>
+              <a:t>Climate Change) </a:t>
+            </a:r>
+            <a:r>
+              <a:rPr lang="th-TH" sz="2600" b="0" dirty="0">
+                <a:solidFill>
+                  <a:srgbClr val="000000"/>
+                </a:solidFill>
+                <a:effectLst/>
+                <a:uFill>
+                  <a:solidFill>
+                    <a:srgbClr val="000000"/>
+                  </a:solidFill>
+                </a:uFill>
+                <a:latin typeface="TH Sarabun New" panose="020B0500040200020003" pitchFamily="34" charset="-34"/>
+                <a:ea typeface="Angsana New" panose="02020603050405020304" pitchFamily="18" charset="-34"/>
+                <a:cs typeface="TH Sarabun New" panose="020B0500040200020003" pitchFamily="34" charset="-34"/>
+              </a:rPr>
+              <a:t>อาทิ ก๊าซคาร์บอนไดออกไซด์ (</a:t>
+            </a:r>
+            <a:r>
+              <a:rPr lang="en-US" sz="2600" b="0" dirty="0">
+                <a:solidFill>
+                  <a:srgbClr val="000000"/>
+                </a:solidFill>
+                <a:effectLst/>
+                <a:uFill>
+                  <a:solidFill>
+                    <a:srgbClr val="000000"/>
+                  </a:solidFill>
+                </a:uFill>
+                <a:latin typeface="TH Sarabun New" panose="020B0500040200020003" pitchFamily="34" charset="-34"/>
+                <a:ea typeface="Angsana New" panose="02020603050405020304" pitchFamily="18" charset="-34"/>
+                <a:cs typeface="TH Sarabun New" panose="020B0500040200020003" pitchFamily="34" charset="-34"/>
+              </a:rPr>
+              <a:t>CO2) </a:t>
+            </a:r>
+            <a:r>
+              <a:rPr lang="th-TH" sz="2600" b="0" dirty="0">
+                <a:solidFill>
+                  <a:srgbClr val="000000"/>
+                </a:solidFill>
+                <a:effectLst/>
+                <a:uFill>
+                  <a:solidFill>
+                    <a:srgbClr val="000000"/>
+                  </a:solidFill>
+                </a:uFill>
+                <a:latin typeface="TH Sarabun New" panose="020B0500040200020003" pitchFamily="34" charset="-34"/>
+                <a:ea typeface="Angsana New" panose="02020603050405020304" pitchFamily="18" charset="-34"/>
+                <a:cs typeface="TH Sarabun New" panose="020B0500040200020003" pitchFamily="34" charset="-34"/>
+              </a:rPr>
+              <a:t>ก๊าซมีเทน (</a:t>
+            </a:r>
+            <a:r>
+              <a:rPr lang="en-US" sz="2600" b="0" dirty="0">
+                <a:solidFill>
+                  <a:srgbClr val="000000"/>
+                </a:solidFill>
+                <a:effectLst/>
+                <a:uFill>
+                  <a:solidFill>
+                    <a:srgbClr val="000000"/>
+                  </a:solidFill>
+                </a:uFill>
+                <a:latin typeface="TH Sarabun New" panose="020B0500040200020003" pitchFamily="34" charset="-34"/>
+                <a:ea typeface="Angsana New" panose="02020603050405020304" pitchFamily="18" charset="-34"/>
+                <a:cs typeface="TH Sarabun New" panose="020B0500040200020003" pitchFamily="34" charset="-34"/>
+              </a:rPr>
+              <a:t>CH4) </a:t>
+            </a:r>
+            <a:r>
+              <a:rPr lang="th-TH" sz="2600" b="0" dirty="0">
+                <a:solidFill>
+                  <a:srgbClr val="000000"/>
+                </a:solidFill>
+                <a:effectLst/>
+                <a:uFill>
+                  <a:solidFill>
+                    <a:srgbClr val="000000"/>
+                  </a:solidFill>
+                </a:uFill>
+                <a:latin typeface="TH Sarabun New" panose="020B0500040200020003" pitchFamily="34" charset="-34"/>
+                <a:ea typeface="Angsana New" panose="02020603050405020304" pitchFamily="18" charset="-34"/>
+                <a:cs typeface="TH Sarabun New" panose="020B0500040200020003" pitchFamily="34" charset="-34"/>
+              </a:rPr>
+              <a:t>เป็นต้น ค่าสัมประสิทธิ์การปล่อยก๊าซเรือนกระจกนี้ มีความสำคัญต่อการประเมินคาร์บอนฟุตพรินต์ ฉลากด้านสิ่งแวดล้อม (ฉลากคาร์บอนฟุตพรินต์ขององค์กร ฉลากคาร์บอนฟุตพรินต์ของผลิตภัณฑ์ ฉลากลดคาร์บอน) ที่สำคัญและรู้จักกันอย่างแพร่หลายของผู้ประกอบในประเทศไทย</a:t>
+            </a:r>
+            <a:endParaRPr lang="en-US" sz="2600" dirty="0">
+              <a:latin typeface="TH Sarabun New" panose="020B0500040200020003" pitchFamily="34" charset="-34"/>
+              <a:cs typeface="TH Sarabun New" panose="020B0500040200020003" pitchFamily="34" charset="-34"/>
+            </a:endParaRPr>
           </a:p>
         </p:txBody>
       </p:sp>
@@ -3943,7 +4569,7 @@
         <p:cNvPr id="1" name="">
           <a:extLst>
             <a:ext uri="{FF2B5EF4-FFF2-40B4-BE49-F238E27FC236}">
-              <a16:creationId xmlns:a16="http://schemas.microsoft.com/office/drawing/2014/main" id="{83F70F33-A017-20AF-84F2-EA528EBB89EA}"/>
+              <a16:creationId xmlns:a16="http://schemas.microsoft.com/office/drawing/2014/main" id="{3B7E712C-6584-FE42-98B4-DC0512552217}"/>
             </a:ext>
           </a:extLst>
         </p:cNvPr>
@@ -3963,7 +4589,7 @@
           <p:cNvPr id="4" name="Title 3">
             <a:extLst>
               <a:ext uri="{FF2B5EF4-FFF2-40B4-BE49-F238E27FC236}">
-                <a16:creationId xmlns:a16="http://schemas.microsoft.com/office/drawing/2014/main" id="{03B4009C-1DD8-216B-91E4-CA3278C6C2ED}"/>
+                <a16:creationId xmlns:a16="http://schemas.microsoft.com/office/drawing/2014/main" id="{87DFA3EF-A814-7EDC-3672-46EB93C6A63D}"/>
               </a:ext>
             </a:extLst>
           </p:cNvPr>
@@ -3976,29 +4602,180 @@
         </p:nvSpPr>
         <p:spPr>
           <a:xfrm>
-            <a:off x="1524000" y="1122363"/>
-            <a:ext cx="4689231" cy="1140191"/>
+            <a:off x="0" y="0"/>
+            <a:ext cx="7139354" cy="494402"/>
           </a:xfrm>
         </p:spPr>
         <p:txBody>
-          <a:bodyPr/>
-          <a:lstStyle/>
-          <a:p>
-            <a:r>
-              <a:rPr lang="th-TH" sz="6000" b="0" i="0" u="none" strike="noStrike" baseline="0" dirty="0">
-                <a:latin typeface="TH Sarabun New" panose="020B0500040200020003" pitchFamily="34" charset="-34"/>
-                <a:cs typeface="TH Sarabun New" panose="020B0500040200020003" pitchFamily="34" charset="-34"/>
-              </a:rPr>
-              <a:t>2.ทฤษฎีที่เกี่ยวข้อง</a:t>
-            </a:r>
-            <a:endParaRPr lang="en-US" dirty="0"/>
+          <a:bodyPr>
+            <a:normAutofit/>
+          </a:bodyPr>
+          <a:lstStyle/>
+          <a:p>
+            <a:pPr algn="l"/>
+            <a:r>
+              <a:rPr lang="th-TH" sz="2600" b="0" i="0" u="none" strike="noStrike" baseline="0" dirty="0">
+                <a:latin typeface="TH Sarabun New" panose="020B0500040200020003" pitchFamily="34" charset="-34"/>
+                <a:cs typeface="TH Sarabun New" panose="020B0500040200020003" pitchFamily="34" charset="-34"/>
+              </a:rPr>
+              <a:t>1.ที่มาและความสำคัญของปัญหา</a:t>
+            </a:r>
+            <a:endParaRPr lang="en-US" sz="2600" dirty="0"/>
+          </a:p>
+        </p:txBody>
+      </p:sp>
+      <p:sp>
+        <p:nvSpPr>
+          <p:cNvPr id="3" name="TextBox 2">
+            <a:extLst>
+              <a:ext uri="{FF2B5EF4-FFF2-40B4-BE49-F238E27FC236}">
+                <a16:creationId xmlns:a16="http://schemas.microsoft.com/office/drawing/2014/main" id="{A5AA56F1-5053-C2A8-4BEF-425F7788548E}"/>
+              </a:ext>
+            </a:extLst>
+          </p:cNvPr>
+          <p:cNvSpPr txBox="1"/>
+          <p:nvPr/>
+        </p:nvSpPr>
+        <p:spPr>
+          <a:xfrm>
+            <a:off x="891206" y="871330"/>
+            <a:ext cx="10747513" cy="1323439"/>
+          </a:xfrm>
+          <a:prstGeom prst="rect">
+            <a:avLst/>
+          </a:prstGeom>
+          <a:noFill/>
+        </p:spPr>
+        <p:txBody>
+          <a:bodyPr wrap="square">
+            <a:spAutoFit/>
+          </a:bodyPr>
+          <a:lstStyle/>
+          <a:p>
+            <a:r>
+              <a:rPr lang="th-TH" sz="2600" dirty="0">
+                <a:latin typeface="TH Sarabun New" panose="020B0500040200020003" pitchFamily="34" charset="-34"/>
+                <a:cs typeface="TH Sarabun New" panose="020B0500040200020003" pitchFamily="34" charset="-34"/>
+              </a:rPr>
+              <a:t>เนื่องจากการค้นหา</a:t>
+            </a:r>
+            <a:r>
+              <a:rPr lang="th-TH" sz="2600" b="0" dirty="0">
+                <a:solidFill>
+                  <a:srgbClr val="000000"/>
+                </a:solidFill>
+                <a:effectLst/>
+                <a:uFill>
+                  <a:solidFill>
+                    <a:srgbClr val="000000"/>
+                  </a:solidFill>
+                </a:uFill>
+                <a:latin typeface="TH Sarabun New" panose="020B0500040200020003" pitchFamily="34" charset="-34"/>
+                <a:ea typeface="Angsana New" panose="02020603050405020304" pitchFamily="18" charset="-34"/>
+                <a:cs typeface="TH Sarabun New" panose="020B0500040200020003" pitchFamily="34" charset="-34"/>
+              </a:rPr>
+              <a:t>ค่าสัมประสิทธิ์การปล่อยก๊าซเรือนกระจกบนเว็บไซต์ของ</a:t>
+            </a:r>
+            <a:r>
+              <a:rPr lang="th-TH" sz="2600" dirty="0">
+                <a:latin typeface="TH Sarabun New" panose="020B0500040200020003" pitchFamily="34" charset="-34"/>
+                <a:cs typeface="TH Sarabun New" panose="020B0500040200020003" pitchFamily="34" charset="-34"/>
+              </a:rPr>
+              <a:t>องค์การบริหารจัดการก๊าซเรือนกระจกไม่ยืดหยุ่น โดยจะต้องค้นหาคำที่เฉพาะเจาะจงเท่านั้น ดังนั้นจึงมีความสนใจที่จะทำให้การค้นหานั้นยืดหยุ่นขึ้นโดยสามารถที่จะค้นหาได้ทั้งภาษาไทยและภาษาอังกฤษที่มีความหมายเหมือนกัน หรือระบบค้นหาแบบ</a:t>
+            </a:r>
+            <a:r>
+              <a:rPr lang="en-US" sz="2600" dirty="0">
+                <a:latin typeface="TH Sarabun New" panose="020B0500040200020003" pitchFamily="34" charset="-34"/>
+                <a:cs typeface="TH Sarabun New" panose="020B0500040200020003" pitchFamily="34" charset="-34"/>
+              </a:rPr>
+              <a:t>2 </a:t>
+            </a:r>
+            <a:r>
+              <a:rPr lang="th-TH" sz="2600" dirty="0">
+                <a:latin typeface="TH Sarabun New" panose="020B0500040200020003" pitchFamily="34" charset="-34"/>
+                <a:cs typeface="TH Sarabun New" panose="020B0500040200020003" pitchFamily="34" charset="-34"/>
+              </a:rPr>
+              <a:t>ภาษา</a:t>
+            </a:r>
+            <a:endParaRPr lang="en-US" sz="2600" dirty="0">
+              <a:latin typeface="TH Sarabun New" panose="020B0500040200020003" pitchFamily="34" charset="-34"/>
+              <a:cs typeface="TH Sarabun New" panose="020B0500040200020003" pitchFamily="34" charset="-34"/>
+            </a:endParaRPr>
+          </a:p>
+        </p:txBody>
+      </p:sp>
+      <p:pic>
+        <p:nvPicPr>
+          <p:cNvPr id="9" name="Picture 8">
+            <a:extLst>
+              <a:ext uri="{FF2B5EF4-FFF2-40B4-BE49-F238E27FC236}">
+                <a16:creationId xmlns:a16="http://schemas.microsoft.com/office/drawing/2014/main" id="{BDB744C3-7BF3-72CA-ED27-6F02F5D9F3DD}"/>
+              </a:ext>
+            </a:extLst>
+          </p:cNvPr>
+          <p:cNvPicPr>
+            <a:picLocks noChangeAspect="1"/>
+          </p:cNvPicPr>
+          <p:nvPr/>
+        </p:nvPicPr>
+        <p:blipFill>
+          <a:blip r:embed="rId2"/>
+          <a:stretch>
+            <a:fillRect/>
+          </a:stretch>
+        </p:blipFill>
+        <p:spPr>
+          <a:xfrm>
+            <a:off x="2150717" y="2146854"/>
+            <a:ext cx="7890566" cy="4013874"/>
+          </a:xfrm>
+          <a:prstGeom prst="rect">
+            <a:avLst/>
+          </a:prstGeom>
+        </p:spPr>
+      </p:pic>
+      <p:sp>
+        <p:nvSpPr>
+          <p:cNvPr id="5" name="TextBox 4">
+            <a:extLst>
+              <a:ext uri="{FF2B5EF4-FFF2-40B4-BE49-F238E27FC236}">
+                <a16:creationId xmlns:a16="http://schemas.microsoft.com/office/drawing/2014/main" id="{082DABD3-E8B1-10EF-EFB5-81B2DDBBB24D}"/>
+              </a:ext>
+            </a:extLst>
+          </p:cNvPr>
+          <p:cNvSpPr txBox="1"/>
+          <p:nvPr/>
+        </p:nvSpPr>
+        <p:spPr>
+          <a:xfrm>
+            <a:off x="7494104" y="6581001"/>
+            <a:ext cx="4817166" cy="276999"/>
+          </a:xfrm>
+          <a:prstGeom prst="rect">
+            <a:avLst/>
+          </a:prstGeom>
+          <a:noFill/>
+        </p:spPr>
+        <p:txBody>
+          <a:bodyPr wrap="square">
+            <a:spAutoFit/>
+          </a:bodyPr>
+          <a:lstStyle/>
+          <a:p>
+            <a:r>
+              <a:rPr lang="en-US" sz="1200" dirty="0">
+                <a:latin typeface="TH Sarabun New" panose="020B0500040200020003" pitchFamily="34" charset="-34"/>
+                <a:cs typeface="TH Sarabun New" panose="020B0500040200020003" pitchFamily="34" charset="-34"/>
+              </a:rPr>
+              <a:t>https://thaicarbonlabel.tgo.or.th/index.php?lang=TH&amp;mod=Y0hKdlpIVmpkSE5mWlcxcGMzTnBiMjQ9</a:t>
+            </a:r>
           </a:p>
         </p:txBody>
       </p:sp>
     </p:spTree>
     <p:extLst>
       <p:ext uri="{BB962C8B-B14F-4D97-AF65-F5344CB8AC3E}">
-        <p14:creationId xmlns:p14="http://schemas.microsoft.com/office/powerpoint/2010/main" val="1318098667"/>
+        <p14:creationId xmlns:p14="http://schemas.microsoft.com/office/powerpoint/2010/main" val="2003123511"/>
       </p:ext>
     </p:extLst>
   </p:cSld>
@@ -4016,7 +4793,7 @@
         <p:cNvPr id="1" name="">
           <a:extLst>
             <a:ext uri="{FF2B5EF4-FFF2-40B4-BE49-F238E27FC236}">
-              <a16:creationId xmlns:a16="http://schemas.microsoft.com/office/drawing/2014/main" id="{600FD762-FC5E-C8AE-731E-81D5F6CC4735}"/>
+              <a16:creationId xmlns:a16="http://schemas.microsoft.com/office/drawing/2014/main" id="{AF2E5A4C-CF91-4FBE-BBF7-1F125589A9E4}"/>
             </a:ext>
           </a:extLst>
         </p:cNvPr>
@@ -4036,7 +4813,7 @@
           <p:cNvPr id="4" name="Title 3">
             <a:extLst>
               <a:ext uri="{FF2B5EF4-FFF2-40B4-BE49-F238E27FC236}">
-                <a16:creationId xmlns:a16="http://schemas.microsoft.com/office/drawing/2014/main" id="{356EB42E-7908-8E21-4B74-2ED82C86FFBF}"/>
+                <a16:creationId xmlns:a16="http://schemas.microsoft.com/office/drawing/2014/main" id="{7B22862E-D091-0169-35F8-847A903B157E}"/>
               </a:ext>
             </a:extLst>
           </p:cNvPr>
@@ -4049,29 +4826,39 @@
         </p:nvSpPr>
         <p:spPr>
           <a:xfrm>
-            <a:off x="1524000" y="1122363"/>
-            <a:ext cx="4572000" cy="1128468"/>
+            <a:off x="0" y="0"/>
+            <a:ext cx="7139354" cy="494402"/>
           </a:xfrm>
         </p:spPr>
         <p:txBody>
-          <a:bodyPr/>
-          <a:lstStyle/>
-          <a:p>
-            <a:r>
-              <a:rPr lang="th-TH" sz="6000" b="0" i="0" u="none" strike="noStrike" baseline="0" dirty="0">
-                <a:latin typeface="TH Sarabun New" panose="020B0500040200020003" pitchFamily="34" charset="-34"/>
-                <a:cs typeface="TH Sarabun New" panose="020B0500040200020003" pitchFamily="34" charset="-34"/>
-              </a:rPr>
-              <a:t>3.งานวิจัยที่เกี่ยวข้อง</a:t>
-            </a:r>
-            <a:endParaRPr lang="en-US" dirty="0"/>
+          <a:bodyPr>
+            <a:normAutofit/>
+          </a:bodyPr>
+          <a:lstStyle/>
+          <a:p>
+            <a:pPr algn="l"/>
+            <a:r>
+              <a:rPr lang="en-US" sz="2600" dirty="0">
+                <a:latin typeface="TH Sarabun New" panose="020B0500040200020003" pitchFamily="34" charset="-34"/>
+                <a:cs typeface="TH Sarabun New" panose="020B0500040200020003" pitchFamily="34" charset="-34"/>
+              </a:rPr>
+              <a:t>2</a:t>
+            </a:r>
+            <a:r>
+              <a:rPr lang="th-TH" sz="2600" b="0" i="0" u="none" strike="noStrike" baseline="0" dirty="0">
+                <a:latin typeface="TH Sarabun New" panose="020B0500040200020003" pitchFamily="34" charset="-34"/>
+                <a:cs typeface="TH Sarabun New" panose="020B0500040200020003" pitchFamily="34" charset="-34"/>
+              </a:rPr>
+              <a:t>.ทฤษฎีที่เกี่ยวข้อง</a:t>
+            </a:r>
+            <a:endParaRPr lang="en-US" sz="2600" dirty="0"/>
           </a:p>
         </p:txBody>
       </p:sp>
     </p:spTree>
     <p:extLst>
       <p:ext uri="{BB962C8B-B14F-4D97-AF65-F5344CB8AC3E}">
-        <p14:creationId xmlns:p14="http://schemas.microsoft.com/office/powerpoint/2010/main" val="4198222911"/>
+        <p14:creationId xmlns:p14="http://schemas.microsoft.com/office/powerpoint/2010/main" val="845814611"/>
       </p:ext>
     </p:extLst>
   </p:cSld>
@@ -4089,7 +4876,7 @@
         <p:cNvPr id="1" name="">
           <a:extLst>
             <a:ext uri="{FF2B5EF4-FFF2-40B4-BE49-F238E27FC236}">
-              <a16:creationId xmlns:a16="http://schemas.microsoft.com/office/drawing/2014/main" id="{47A6D78B-AC27-1470-414E-840E0BD985E5}"/>
+              <a16:creationId xmlns:a16="http://schemas.microsoft.com/office/drawing/2014/main" id="{1985455B-8CCD-F87C-28C7-2612E7EE083A}"/>
             </a:ext>
           </a:extLst>
         </p:cNvPr>
@@ -4109,7 +4896,7 @@
           <p:cNvPr id="4" name="Title 3">
             <a:extLst>
               <a:ext uri="{FF2B5EF4-FFF2-40B4-BE49-F238E27FC236}">
-                <a16:creationId xmlns:a16="http://schemas.microsoft.com/office/drawing/2014/main" id="{A2B870C5-8A36-B094-1022-E16F3629F730}"/>
+                <a16:creationId xmlns:a16="http://schemas.microsoft.com/office/drawing/2014/main" id="{7B15D6E1-86B0-696F-109C-31B5877DCBED}"/>
               </a:ext>
             </a:extLst>
           </p:cNvPr>
@@ -4120,17 +4907,136 @@
             <p:ph type="ctrTitle"/>
           </p:nvPr>
         </p:nvSpPr>
-        <p:spPr/>
-        <p:txBody>
-          <a:bodyPr/>
-          <a:lstStyle/>
-          <a:p>
-            <a:r>
-              <a:rPr lang="th-TH" sz="6000" b="0" i="0" u="none" strike="noStrike" baseline="0" dirty="0">
-                <a:latin typeface="TH Sarabun New" panose="020B0500040200020003" pitchFamily="34" charset="-34"/>
-                <a:cs typeface="TH Sarabun New" panose="020B0500040200020003" pitchFamily="34" charset="-34"/>
-              </a:rPr>
-              <a:t>4.แนวคิดและวิธีการวิจัย</a:t>
+        <p:spPr>
+          <a:xfrm>
+            <a:off x="0" y="0"/>
+            <a:ext cx="7139354" cy="494402"/>
+          </a:xfrm>
+        </p:spPr>
+        <p:txBody>
+          <a:bodyPr>
+            <a:normAutofit/>
+          </a:bodyPr>
+          <a:lstStyle/>
+          <a:p>
+            <a:pPr algn="l"/>
+            <a:r>
+              <a:rPr lang="en-US" sz="2600" dirty="0">
+                <a:latin typeface="TH Sarabun New" panose="020B0500040200020003" pitchFamily="34" charset="-34"/>
+                <a:cs typeface="TH Sarabun New" panose="020B0500040200020003" pitchFamily="34" charset="-34"/>
+              </a:rPr>
+              <a:t>3</a:t>
+            </a:r>
+            <a:r>
+              <a:rPr lang="th-TH" sz="2600" b="0" i="0" u="none" strike="noStrike" baseline="0" dirty="0">
+                <a:latin typeface="TH Sarabun New" panose="020B0500040200020003" pitchFamily="34" charset="-34"/>
+                <a:cs typeface="TH Sarabun New" panose="020B0500040200020003" pitchFamily="34" charset="-34"/>
+              </a:rPr>
+              <a:t>.งานวิจัยที่เกี่ยวข้อง</a:t>
+            </a:r>
+            <a:endParaRPr lang="en-US" sz="2600" dirty="0"/>
+          </a:p>
+        </p:txBody>
+      </p:sp>
+      <p:sp>
+        <p:nvSpPr>
+          <p:cNvPr id="8" name="TextBox 7">
+            <a:extLst>
+              <a:ext uri="{FF2B5EF4-FFF2-40B4-BE49-F238E27FC236}">
+                <a16:creationId xmlns:a16="http://schemas.microsoft.com/office/drawing/2014/main" id="{496F5E3B-4DD9-86C1-1F83-AD8AB60CA79A}"/>
+              </a:ext>
+            </a:extLst>
+          </p:cNvPr>
+          <p:cNvSpPr txBox="1"/>
+          <p:nvPr/>
+        </p:nvSpPr>
+        <p:spPr>
+          <a:xfrm>
+            <a:off x="755649" y="1043000"/>
+            <a:ext cx="9243483" cy="923330"/>
+          </a:xfrm>
+          <a:prstGeom prst="rect">
+            <a:avLst/>
+          </a:prstGeom>
+          <a:noFill/>
+        </p:spPr>
+        <p:txBody>
+          <a:bodyPr wrap="square">
+            <a:spAutoFit/>
+          </a:bodyPr>
+          <a:lstStyle/>
+          <a:p>
+            <a:r>
+              <a:rPr lang="th-TH" sz="1800" b="1" dirty="0">
+                <a:effectLst/>
+                <a:latin typeface="TH Sarabun New" panose="020B0500040200020003" pitchFamily="34" charset="-34"/>
+                <a:ea typeface="Arial Unicode MS"/>
+              </a:rPr>
+              <a:t>งานวิจัย </a:t>
+            </a:r>
+            <a:r>
+              <a:rPr lang="en-US" b="1" dirty="0">
+                <a:latin typeface="TH Sarabun New" panose="020B0500040200020003" pitchFamily="34" charset="-34"/>
+                <a:ea typeface="Arial Unicode MS"/>
+              </a:rPr>
+              <a:t>“</a:t>
+            </a:r>
+            <a:r>
+              <a:rPr lang="en-US" sz="1800" b="1" dirty="0">
+                <a:effectLst/>
+                <a:latin typeface="TH Sarabun New" panose="020B0500040200020003" pitchFamily="34" charset="-34"/>
+                <a:ea typeface="Arial Unicode MS"/>
+              </a:rPr>
+              <a:t>English-Malayalam Cross-Lingual</a:t>
+            </a:r>
+            <a:r>
+              <a:rPr lang="th-TH" sz="1800" b="1" dirty="0">
+                <a:effectLst/>
+                <a:ea typeface="Arial Unicode MS"/>
+                <a:cs typeface="TH Sarabun New" panose="020B0500040200020003" pitchFamily="34" charset="-34"/>
+              </a:rPr>
+              <a:t> </a:t>
+            </a:r>
+            <a:r>
+              <a:rPr lang="en-US" sz="1800" b="1" dirty="0">
+                <a:effectLst/>
+                <a:latin typeface="TH Sarabun New" panose="020B0500040200020003" pitchFamily="34" charset="-34"/>
+                <a:ea typeface="Arial Unicode MS"/>
+              </a:rPr>
+              <a:t>Information Retrieval – an Experience”</a:t>
+            </a:r>
+          </a:p>
+          <a:p>
+            <a:endParaRPr lang="en-US" sz="1800" b="1" dirty="0">
+              <a:effectLst/>
+              <a:latin typeface="TH Sarabun New" panose="020B0500040200020003" pitchFamily="34" charset="-34"/>
+              <a:ea typeface="Arial Unicode MS"/>
+            </a:endParaRPr>
+          </a:p>
+          <a:p>
+            <a:r>
+              <a:rPr lang="th-TH" sz="1800" b="1" dirty="0">
+                <a:effectLst/>
+                <a:latin typeface="TH Sarabun New" panose="020B0500040200020003" pitchFamily="34" charset="-34"/>
+                <a:ea typeface="Arial Unicode MS"/>
+              </a:rPr>
+              <a:t>งานวิจัย </a:t>
+            </a:r>
+            <a:r>
+              <a:rPr lang="en-US" sz="1800" b="1" dirty="0">
+                <a:effectLst/>
+                <a:latin typeface="TH Sarabun New" panose="020B0500040200020003" pitchFamily="34" charset="-34"/>
+                <a:ea typeface="Arial Unicode MS"/>
+              </a:rPr>
+              <a:t>“Cross-Lingual Information Retrieval Model for Vietnamese-English Web Sites”</a:t>
+            </a:r>
+            <a:r>
+              <a:rPr lang="th-TH" sz="1800" b="1" dirty="0">
+                <a:effectLst/>
+                <a:ea typeface="Arial Unicode MS"/>
+                <a:cs typeface="TH Sarabun New" panose="020B0500040200020003" pitchFamily="34" charset="-34"/>
+              </a:rPr>
+              <a:t>  </a:t>
             </a:r>
             <a:endParaRPr lang="en-US" dirty="0"/>
           </a:p>
@@ -4139,7 +5045,7 @@
     </p:spTree>
     <p:extLst>
       <p:ext uri="{BB962C8B-B14F-4D97-AF65-F5344CB8AC3E}">
-        <p14:creationId xmlns:p14="http://schemas.microsoft.com/office/powerpoint/2010/main" val="732224154"/>
+        <p14:creationId xmlns:p14="http://schemas.microsoft.com/office/powerpoint/2010/main" val="687122708"/>
       </p:ext>
     </p:extLst>
   </p:cSld>
@@ -4157,7 +5063,7 @@
         <p:cNvPr id="1" name="">
           <a:extLst>
             <a:ext uri="{FF2B5EF4-FFF2-40B4-BE49-F238E27FC236}">
-              <a16:creationId xmlns:a16="http://schemas.microsoft.com/office/drawing/2014/main" id="{D08B4F2E-8FFF-16FA-7844-81B44BF5CD79}"/>
+              <a16:creationId xmlns:a16="http://schemas.microsoft.com/office/drawing/2014/main" id="{D83AF650-62D9-E0E0-516A-1E25BDA2D1F7}"/>
             </a:ext>
           </a:extLst>
         </p:cNvPr>
@@ -4177,7 +5083,7 @@
           <p:cNvPr id="4" name="Title 3">
             <a:extLst>
               <a:ext uri="{FF2B5EF4-FFF2-40B4-BE49-F238E27FC236}">
-                <a16:creationId xmlns:a16="http://schemas.microsoft.com/office/drawing/2014/main" id="{56D90C69-A0F3-5253-1D01-B72E273E7957}"/>
+                <a16:creationId xmlns:a16="http://schemas.microsoft.com/office/drawing/2014/main" id="{9B3B996D-D2AE-61F0-67BE-EE965AABAB2F}"/>
               </a:ext>
             </a:extLst>
           </p:cNvPr>
@@ -4188,26 +5094,70 @@
             <p:ph type="ctrTitle"/>
           </p:nvPr>
         </p:nvSpPr>
-        <p:spPr/>
-        <p:txBody>
-          <a:bodyPr/>
-          <a:lstStyle/>
-          <a:p>
-            <a:r>
-              <a:rPr lang="th-TH" sz="6000" b="0" i="0" u="none" strike="noStrike" baseline="0" dirty="0">
-                <a:latin typeface="TH Sarabun New" panose="020B0500040200020003" pitchFamily="34" charset="-34"/>
-                <a:cs typeface="TH Sarabun New" panose="020B0500040200020003" pitchFamily="34" charset="-34"/>
-              </a:rPr>
-              <a:t>5.วัตถุประสงค์</a:t>
-            </a:r>
-            <a:endParaRPr lang="en-US" dirty="0"/>
-          </a:p>
-        </p:txBody>
-      </p:sp>
+        <p:spPr>
+          <a:xfrm>
+            <a:off x="0" y="0"/>
+            <a:ext cx="7139354" cy="494402"/>
+          </a:xfrm>
+        </p:spPr>
+        <p:txBody>
+          <a:bodyPr>
+            <a:normAutofit/>
+          </a:bodyPr>
+          <a:lstStyle/>
+          <a:p>
+            <a:pPr algn="l"/>
+            <a:r>
+              <a:rPr lang="th-TH" sz="2600" b="0" i="0" u="none" strike="noStrike" baseline="0">
+                <a:latin typeface="TH Sarabun New" panose="020B0500040200020003" pitchFamily="34" charset="-34"/>
+                <a:cs typeface="TH Sarabun New" panose="020B0500040200020003" pitchFamily="34" charset="-34"/>
+              </a:rPr>
+              <a:t>4.แนวคิดและวิธีการวิจัย</a:t>
+            </a:r>
+            <a:endParaRPr lang="en-US" sz="2600" dirty="0"/>
+          </a:p>
+        </p:txBody>
+      </p:sp>
+      <p:pic>
+        <p:nvPicPr>
+          <p:cNvPr id="6" name="Picture 5" descr="A diagram of a process flow&#10;&#10;Description automatically generated">
+            <a:extLst>
+              <a:ext uri="{FF2B5EF4-FFF2-40B4-BE49-F238E27FC236}">
+                <a16:creationId xmlns:a16="http://schemas.microsoft.com/office/drawing/2014/main" id="{09D96476-F58F-2AD6-9F41-2A649C4C7611}"/>
+              </a:ext>
+            </a:extLst>
+          </p:cNvPr>
+          <p:cNvPicPr>
+            <a:picLocks noChangeAspect="1"/>
+          </p:cNvPicPr>
+          <p:nvPr/>
+        </p:nvPicPr>
+        <p:blipFill>
+          <a:blip r:embed="rId2">
+            <a:extLst>
+              <a:ext uri="{28A0092B-C50C-407E-A947-70E740481C1C}">
+                <a14:useLocalDpi xmlns:a14="http://schemas.microsoft.com/office/drawing/2010/main" val="0"/>
+              </a:ext>
+            </a:extLst>
+          </a:blip>
+          <a:stretch>
+            <a:fillRect/>
+          </a:stretch>
+        </p:blipFill>
+        <p:spPr>
+          <a:xfrm>
+            <a:off x="3679742" y="0"/>
+            <a:ext cx="4563239" cy="6858000"/>
+          </a:xfrm>
+          <a:prstGeom prst="rect">
+            <a:avLst/>
+          </a:prstGeom>
+        </p:spPr>
+      </p:pic>
     </p:spTree>
     <p:extLst>
       <p:ext uri="{BB962C8B-B14F-4D97-AF65-F5344CB8AC3E}">
-        <p14:creationId xmlns:p14="http://schemas.microsoft.com/office/powerpoint/2010/main" val="3758030495"/>
+        <p14:creationId xmlns:p14="http://schemas.microsoft.com/office/powerpoint/2010/main" val="1564421016"/>
       </p:ext>
     </p:extLst>
   </p:cSld>
@@ -4225,7 +5175,7 @@
         <p:cNvPr id="1" name="">
           <a:extLst>
             <a:ext uri="{FF2B5EF4-FFF2-40B4-BE49-F238E27FC236}">
-              <a16:creationId xmlns:a16="http://schemas.microsoft.com/office/drawing/2014/main" id="{B7CBC71F-84B0-9DCC-8910-6948331626F1}"/>
+              <a16:creationId xmlns:a16="http://schemas.microsoft.com/office/drawing/2014/main" id="{2BC4EB66-4550-7F92-4587-E48C4C05D9DF}"/>
             </a:ext>
           </a:extLst>
         </p:cNvPr>
@@ -4245,7 +5195,7 @@
           <p:cNvPr id="4" name="Title 3">
             <a:extLst>
               <a:ext uri="{FF2B5EF4-FFF2-40B4-BE49-F238E27FC236}">
-                <a16:creationId xmlns:a16="http://schemas.microsoft.com/office/drawing/2014/main" id="{5DBD32EC-A00E-5EB2-5284-1B8844679BE0}"/>
+                <a16:creationId xmlns:a16="http://schemas.microsoft.com/office/drawing/2014/main" id="{E5E27098-84DE-6EC4-8983-EADC0825232C}"/>
               </a:ext>
             </a:extLst>
           </p:cNvPr>
@@ -4256,17 +5206,103 @@
             <p:ph type="ctrTitle"/>
           </p:nvPr>
         </p:nvSpPr>
-        <p:spPr/>
-        <p:txBody>
-          <a:bodyPr/>
-          <a:lstStyle/>
-          <a:p>
-            <a:r>
-              <a:rPr lang="th-TH" sz="6000" b="0" i="0" u="none" strike="noStrike" baseline="0" dirty="0">
-                <a:latin typeface="TH Sarabun New" panose="020B0500040200020003" pitchFamily="34" charset="-34"/>
-                <a:cs typeface="TH Sarabun New" panose="020B0500040200020003" pitchFamily="34" charset="-34"/>
-              </a:rPr>
-              <a:t>6.ขอบเขตการวิจัย</a:t>
+        <p:spPr>
+          <a:xfrm>
+            <a:off x="0" y="0"/>
+            <a:ext cx="7139354" cy="494402"/>
+          </a:xfrm>
+        </p:spPr>
+        <p:txBody>
+          <a:bodyPr>
+            <a:normAutofit/>
+          </a:bodyPr>
+          <a:lstStyle/>
+          <a:p>
+            <a:pPr algn="l"/>
+            <a:r>
+              <a:rPr lang="th-TH" sz="2600" b="0" i="0" u="none" strike="noStrike" baseline="0" dirty="0">
+                <a:latin typeface="TH Sarabun New" panose="020B0500040200020003" pitchFamily="34" charset="-34"/>
+                <a:cs typeface="TH Sarabun New" panose="020B0500040200020003" pitchFamily="34" charset="-34"/>
+              </a:rPr>
+              <a:t>4.แนวคิดและวิธีการวิจัย</a:t>
+            </a:r>
+            <a:endParaRPr lang="en-US" sz="2600" dirty="0"/>
+          </a:p>
+        </p:txBody>
+      </p:sp>
+      <p:sp>
+        <p:nvSpPr>
+          <p:cNvPr id="3" name="TextBox 2">
+            <a:extLst>
+              <a:ext uri="{FF2B5EF4-FFF2-40B4-BE49-F238E27FC236}">
+                <a16:creationId xmlns:a16="http://schemas.microsoft.com/office/drawing/2014/main" id="{2F5242B4-E5F3-45B4-2D49-EBF61446C3CC}"/>
+              </a:ext>
+            </a:extLst>
+          </p:cNvPr>
+          <p:cNvSpPr txBox="1"/>
+          <p:nvPr/>
+        </p:nvSpPr>
+        <p:spPr>
+          <a:xfrm>
+            <a:off x="931332" y="746667"/>
+            <a:ext cx="9635067" cy="1477328"/>
+          </a:xfrm>
+          <a:prstGeom prst="rect">
+            <a:avLst/>
+          </a:prstGeom>
+          <a:noFill/>
+        </p:spPr>
+        <p:txBody>
+          <a:bodyPr wrap="square">
+            <a:spAutoFit/>
+          </a:bodyPr>
+          <a:lstStyle/>
+          <a:p>
+            <a:r>
+              <a:rPr lang="th-TH" dirty="0"/>
+              <a:t>ทำไมถึงเลือก </a:t>
+            </a:r>
+            <a:r>
+              <a:rPr lang="en-US" dirty="0" err="1"/>
+              <a:t>elasticsearch</a:t>
+            </a:r>
+            <a:endParaRPr lang="th-TH" dirty="0"/>
+          </a:p>
+          <a:p>
+            <a:endParaRPr lang="th-TH" dirty="0"/>
+          </a:p>
+          <a:p>
+            <a:r>
+              <a:rPr lang="en-US" dirty="0"/>
+              <a:t>Elasticsearch </a:t>
+            </a:r>
+            <a:r>
+              <a:rPr lang="th-TH" dirty="0"/>
+              <a:t>มีคุณสมบัติเหมาะสมกับการค้นคืนข้อมูลข้ามภาษา (</a:t>
+            </a:r>
+            <a:r>
+              <a:rPr lang="en-US" dirty="0"/>
+              <a:t>Cross-Lingual Information Retrieval - CLIR) </a:t>
+            </a:r>
+            <a:r>
+              <a:rPr lang="th-TH" dirty="0"/>
+              <a:t>และรองรับการทำงานที่ซับซ้อน เช่น การวิเคราะห์คำพ้องความหมาย (</a:t>
+            </a:r>
+            <a:r>
+              <a:rPr lang="en-US" dirty="0"/>
+              <a:t>Synonym Matching) </a:t>
+            </a:r>
+            <a:r>
+              <a:rPr lang="th-TH" dirty="0"/>
+              <a:t>และการค้นหาแบบ </a:t>
+            </a:r>
+            <a:r>
+              <a:rPr lang="en-US" dirty="0"/>
+              <a:t>Full-Text Search </a:t>
+            </a:r>
+            <a:r>
+              <a:rPr lang="th-TH" dirty="0"/>
+              <a:t>ได้อย่างมีประสิทธิภาพ</a:t>
             </a:r>
             <a:endParaRPr lang="en-US" dirty="0"/>
           </a:p>
@@ -4275,7 +5311,7 @@
     </p:spTree>
     <p:extLst>
       <p:ext uri="{BB962C8B-B14F-4D97-AF65-F5344CB8AC3E}">
-        <p14:creationId xmlns:p14="http://schemas.microsoft.com/office/powerpoint/2010/main" val="3399248421"/>
+        <p14:creationId xmlns:p14="http://schemas.microsoft.com/office/powerpoint/2010/main" val="1039547793"/>
       </p:ext>
     </p:extLst>
   </p:cSld>
@@ -4293,7 +5329,7 @@
         <p:cNvPr id="1" name="">
           <a:extLst>
             <a:ext uri="{FF2B5EF4-FFF2-40B4-BE49-F238E27FC236}">
-              <a16:creationId xmlns:a16="http://schemas.microsoft.com/office/drawing/2014/main" id="{3113E957-E7D3-BA5F-7B4F-2BEBC1C25270}"/>
+              <a16:creationId xmlns:a16="http://schemas.microsoft.com/office/drawing/2014/main" id="{F7B287E4-A4B1-07C7-28DF-0A95D944C96B}"/>
             </a:ext>
           </a:extLst>
         </p:cNvPr>
@@ -4313,7 +5349,7 @@
           <p:cNvPr id="4" name="Title 3">
             <a:extLst>
               <a:ext uri="{FF2B5EF4-FFF2-40B4-BE49-F238E27FC236}">
-                <a16:creationId xmlns:a16="http://schemas.microsoft.com/office/drawing/2014/main" id="{E2B0ECCC-77CA-83F9-C619-DD01FF56E002}"/>
+                <a16:creationId xmlns:a16="http://schemas.microsoft.com/office/drawing/2014/main" id="{3A643B07-88F5-E8BA-C77B-63B9F7D49314}"/>
               </a:ext>
             </a:extLst>
           </p:cNvPr>
@@ -4324,26 +5360,141 @@
             <p:ph type="ctrTitle"/>
           </p:nvPr>
         </p:nvSpPr>
-        <p:spPr/>
-        <p:txBody>
-          <a:bodyPr/>
-          <a:lstStyle/>
-          <a:p>
-            <a:r>
-              <a:rPr lang="th-TH" sz="6000" b="0" i="0" u="none" strike="noStrike" baseline="0" dirty="0">
-                <a:latin typeface="TH Sarabun New" panose="020B0500040200020003" pitchFamily="34" charset="-34"/>
-                <a:cs typeface="TH Sarabun New" panose="020B0500040200020003" pitchFamily="34" charset="-34"/>
-              </a:rPr>
-              <a:t>7.ขั้นตอนการดำ เนินงาน</a:t>
-            </a:r>
-            <a:endParaRPr lang="en-US" dirty="0"/>
+        <p:spPr>
+          <a:xfrm>
+            <a:off x="0" y="0"/>
+            <a:ext cx="7139354" cy="494402"/>
+          </a:xfrm>
+        </p:spPr>
+        <p:txBody>
+          <a:bodyPr>
+            <a:normAutofit/>
+          </a:bodyPr>
+          <a:lstStyle/>
+          <a:p>
+            <a:pPr algn="l"/>
+            <a:r>
+              <a:rPr lang="th-TH" sz="2600" b="0" i="0" u="none" strike="noStrike" baseline="0" dirty="0">
+                <a:latin typeface="TH Sarabun New" panose="020B0500040200020003" pitchFamily="34" charset="-34"/>
+                <a:cs typeface="TH Sarabun New" panose="020B0500040200020003" pitchFamily="34" charset="-34"/>
+              </a:rPr>
+              <a:t>5.วัตถุประสงค์</a:t>
+            </a:r>
+            <a:endParaRPr lang="en-US" sz="2600" dirty="0"/>
+          </a:p>
+        </p:txBody>
+      </p:sp>
+      <p:sp>
+        <p:nvSpPr>
+          <p:cNvPr id="3" name="TextBox 2">
+            <a:extLst>
+              <a:ext uri="{FF2B5EF4-FFF2-40B4-BE49-F238E27FC236}">
+                <a16:creationId xmlns:a16="http://schemas.microsoft.com/office/drawing/2014/main" id="{D5FD47D1-4A63-BE3B-A468-14CD997770D1}"/>
+              </a:ext>
+            </a:extLst>
+          </p:cNvPr>
+          <p:cNvSpPr txBox="1"/>
+          <p:nvPr/>
+        </p:nvSpPr>
+        <p:spPr>
+          <a:xfrm>
+            <a:off x="609600" y="1406435"/>
+            <a:ext cx="11311467" cy="892552"/>
+          </a:xfrm>
+          <a:prstGeom prst="rect">
+            <a:avLst/>
+          </a:prstGeom>
+          <a:noFill/>
+        </p:spPr>
+        <p:txBody>
+          <a:bodyPr wrap="square">
+            <a:spAutoFit/>
+          </a:bodyPr>
+          <a:lstStyle/>
+          <a:p>
+            <a:r>
+              <a:rPr lang="en-US" sz="2600" dirty="0">
+                <a:latin typeface="TH Sarabun New" panose="020B0500040200020003" pitchFamily="34" charset="-34"/>
+                <a:cs typeface="TH Sarabun New" panose="020B0500040200020003" pitchFamily="34" charset="-34"/>
+              </a:rPr>
+              <a:t>1.</a:t>
+            </a:r>
+            <a:r>
+              <a:rPr lang="th-TH" sz="2600" dirty="0">
+                <a:latin typeface="TH Sarabun New" panose="020B0500040200020003" pitchFamily="34" charset="-34"/>
+                <a:cs typeface="TH Sarabun New" panose="020B0500040200020003" pitchFamily="34" charset="-34"/>
+              </a:rPr>
+              <a:t> </a:t>
+            </a:r>
+            <a:r>
+              <a:rPr lang="en-US" sz="2600" dirty="0">
+                <a:latin typeface="TH Sarabun New" panose="020B0500040200020003" pitchFamily="34" charset="-34"/>
+                <a:cs typeface="TH Sarabun New" panose="020B0500040200020003" pitchFamily="34" charset="-34"/>
+              </a:rPr>
+              <a:t>เพื่อพัฒนาระบบสืบค้นข้อมูลค่าการปล่อยก๊าซเรือนกระจกที่รองรับการค้นหาได้ทั้งภาษาไทยและภาษาอังกฤษ (Cross-lingual)</a:t>
+            </a:r>
+          </a:p>
+          <a:p>
+            <a:r>
+              <a:rPr lang="en-US" sz="2600" dirty="0">
+                <a:latin typeface="TH Sarabun New" panose="020B0500040200020003" pitchFamily="34" charset="-34"/>
+                <a:cs typeface="TH Sarabun New" panose="020B0500040200020003" pitchFamily="34" charset="-34"/>
+              </a:rPr>
+              <a:t>2</a:t>
+            </a:r>
+            <a:r>
+              <a:rPr lang="th-TH" sz="2600" dirty="0">
+                <a:latin typeface="TH Sarabun New" panose="020B0500040200020003" pitchFamily="34" charset="-34"/>
+                <a:cs typeface="TH Sarabun New" panose="020B0500040200020003" pitchFamily="34" charset="-34"/>
+              </a:rPr>
+              <a:t>. </a:t>
+            </a:r>
+            <a:r>
+              <a:rPr lang="en-US" sz="2600" dirty="0" err="1">
+                <a:latin typeface="TH Sarabun New" panose="020B0500040200020003" pitchFamily="34" charset="-34"/>
+                <a:cs typeface="TH Sarabun New" panose="020B0500040200020003" pitchFamily="34" charset="-34"/>
+              </a:rPr>
+              <a:t>เพื่ออำนวยความสะดวกสามารถเข้าถึงเอกสาร</a:t>
+            </a:r>
+            <a:r>
+              <a:rPr lang="en-US" sz="2600" dirty="0">
+                <a:latin typeface="TH Sarabun New" panose="020B0500040200020003" pitchFamily="34" charset="-34"/>
+                <a:cs typeface="TH Sarabun New" panose="020B0500040200020003" pitchFamily="34" charset="-34"/>
+              </a:rPr>
+              <a:t>/</a:t>
+            </a:r>
+            <a:r>
+              <a:rPr lang="en-US" sz="2600" dirty="0" err="1">
+                <a:latin typeface="TH Sarabun New" panose="020B0500040200020003" pitchFamily="34" charset="-34"/>
+                <a:cs typeface="TH Sarabun New" panose="020B0500040200020003" pitchFamily="34" charset="-34"/>
+              </a:rPr>
+              <a:t>ข้อมูล</a:t>
+            </a:r>
+            <a:r>
+              <a:rPr lang="en-US" sz="2600" dirty="0">
+                <a:latin typeface="TH Sarabun New" panose="020B0500040200020003" pitchFamily="34" charset="-34"/>
+                <a:cs typeface="TH Sarabun New" panose="020B0500040200020003" pitchFamily="34" charset="-34"/>
+              </a:rPr>
+              <a:t> Emission Factors </a:t>
+            </a:r>
+            <a:r>
+              <a:rPr lang="en-US" sz="2600" dirty="0" err="1">
+                <a:latin typeface="TH Sarabun New" panose="020B0500040200020003" pitchFamily="34" charset="-34"/>
+                <a:cs typeface="TH Sarabun New" panose="020B0500040200020003" pitchFamily="34" charset="-34"/>
+              </a:rPr>
+              <a:t>ที่มีอยู่ได้อย่างรวดเร็ว</a:t>
+            </a:r>
+            <a:endParaRPr lang="en-US" sz="2600" dirty="0">
+              <a:latin typeface="TH Sarabun New" panose="020B0500040200020003" pitchFamily="34" charset="-34"/>
+              <a:cs typeface="TH Sarabun New" panose="020B0500040200020003" pitchFamily="34" charset="-34"/>
+            </a:endParaRPr>
           </a:p>
         </p:txBody>
       </p:sp>
     </p:spTree>
     <p:extLst>
       <p:ext uri="{BB962C8B-B14F-4D97-AF65-F5344CB8AC3E}">
-        <p14:creationId xmlns:p14="http://schemas.microsoft.com/office/powerpoint/2010/main" val="1838282114"/>
+        <p14:creationId xmlns:p14="http://schemas.microsoft.com/office/powerpoint/2010/main" val="4088465143"/>
       </p:ext>
     </p:extLst>
   </p:cSld>

</xml_diff>